<commit_message>
ecn text heading tweak
</commit_message>
<xml_diff>
--- a/anrw-berlin-16/pathspider-poster.pptx
+++ b/anrw-berlin-16/pathspider-poster.pptx
@@ -4233,7 +4233,7 @@
         <p:spPr>
           <a:xfrm>
             <a:off x="13173206" y="16943903"/>
-            <a:ext cx="9755086" cy="1023998"/>
+            <a:ext cx="9755086" cy="989053"/>
           </a:xfrm>
           <a:prstGeom prst="rect">
             <a:avLst/>
@@ -4257,7 +4257,91 @@
                 </a:uFill>
                 <a:latin typeface="Helvetica Neue"/>
               </a:rPr>
-              <a:t>An ECN measurement from one vantage point at Digital Ocean near AMSIX (Amsterdam NL) on June 13, 2016</a:t>
+              <a:t>S</a:t>
+            </a:r>
+            <a:r>
+              <a:rPr lang="en-GB" sz="2800" spc="-1" dirty="0" smtClean="0">
+                <a:solidFill>
+                  <a:srgbClr val="000000"/>
+                </a:solidFill>
+                <a:uFill>
+                  <a:solidFill>
+                    <a:srgbClr val="FFFFFF"/>
+                  </a:solidFill>
+                </a:uFill>
+                <a:latin typeface="Helvetica Neue"/>
+              </a:rPr>
+              <a:t>tate of ECN server-side deployment, as measured from</a:t>
+            </a:r>
+            <a:r>
+              <a:rPr lang="en-GB" sz="2800" spc="-1" dirty="0">
+                <a:solidFill>
+                  <a:srgbClr val="000000"/>
+                </a:solidFill>
+                <a:uFill>
+                  <a:solidFill>
+                    <a:srgbClr val="FFFFFF"/>
+                  </a:solidFill>
+                </a:uFill>
+                <a:latin typeface="Helvetica Neue"/>
+              </a:rPr>
+              <a:t> </a:t>
+            </a:r>
+            <a:r>
+              <a:rPr lang="en-GB" sz="2800" spc="-1" dirty="0" smtClean="0">
+                <a:solidFill>
+                  <a:srgbClr val="000000"/>
+                </a:solidFill>
+                <a:uFill>
+                  <a:solidFill>
+                    <a:srgbClr val="FFFFFF"/>
+                  </a:solidFill>
+                </a:uFill>
+                <a:latin typeface="Helvetica Neue"/>
+              </a:rPr>
+              <a:t>a </a:t>
+            </a:r>
+            <a:r>
+              <a:rPr lang="en-GB" sz="2800" spc="-1" dirty="0" smtClean="0">
+                <a:solidFill>
+                  <a:srgbClr val="000000"/>
+                </a:solidFill>
+                <a:uFill>
+                  <a:solidFill>
+                    <a:srgbClr val="FFFFFF"/>
+                  </a:solidFill>
+                </a:uFill>
+                <a:latin typeface="Helvetica Neue"/>
+              </a:rPr>
+              <a:t>Digital Ocean vantage point </a:t>
+            </a:r>
+            <a:r>
+              <a:rPr lang="en-GB" sz="2800" spc="-1" dirty="0" smtClean="0">
+                <a:solidFill>
+                  <a:srgbClr val="000000"/>
+                </a:solidFill>
+                <a:uFill>
+                  <a:solidFill>
+                    <a:srgbClr val="FFFFFF"/>
+                  </a:solidFill>
+                </a:uFill>
+                <a:latin typeface="Helvetica Neue"/>
+              </a:rPr>
+              <a:t>in </a:t>
+            </a:r>
+            <a:r>
+              <a:rPr lang="en-GB" sz="2800" spc="-1" smtClean="0">
+                <a:solidFill>
+                  <a:srgbClr val="000000"/>
+                </a:solidFill>
+                <a:uFill>
+                  <a:solidFill>
+                    <a:srgbClr val="FFFFFF"/>
+                  </a:solidFill>
+                </a:uFill>
+                <a:latin typeface="Helvetica Neue"/>
+              </a:rPr>
+              <a:t>Amsterdam on 13 June 2016</a:t>
             </a:r>
             <a:r>
               <a:rPr lang="en-GB" sz="3027" spc="-1" dirty="0">

</xml_diff>